<commit_message>
Added Requirement Changes slide
just added a slide to show how we change one of the requirements.
</commit_message>
<xml_diff>
--- a/Documentation/Class Presentations/Are We There Yet Progress Report 2.pptx
+++ b/Documentation/Class Presentations/Are We There Yet Progress Report 2.pptx
@@ -5,14 +5,15 @@
     <p:sldMasterId id="2147483660" r:id="rId1"/>
   </p:sldMasterIdLst>
   <p:notesMasterIdLst>
-    <p:notesMasterId r:id="rId7"/>
+    <p:notesMasterId r:id="rId8"/>
   </p:notesMasterIdLst>
   <p:sldIdLst>
     <p:sldId id="256" r:id="rId2"/>
     <p:sldId id="258" r:id="rId3"/>
     <p:sldId id="259" r:id="rId4"/>
-    <p:sldId id="261" r:id="rId5"/>
-    <p:sldId id="260" r:id="rId6"/>
+    <p:sldId id="262" r:id="rId5"/>
+    <p:sldId id="261" r:id="rId6"/>
+    <p:sldId id="260" r:id="rId7"/>
   </p:sldIdLst>
   <p:sldSz cx="12192000" cy="6858000"/>
   <p:notesSz cx="6858000" cy="9144000"/>
@@ -111,6 +112,11 @@
       </a:defRPr>
     </a:lvl9pPr>
   </p:defaultTextStyle>
+  <p:extLst>
+    <p:ext uri="{EFAFB233-063F-42B5-8137-9DF3F51BA10A}">
+      <p15:sldGuideLst xmlns:p15="http://schemas.microsoft.com/office/powerpoint/2012/main"/>
+    </p:ext>
+  </p:extLst>
 </p:presentation>
 </file>
 
@@ -196,7 +202,7 @@
           <a:p>
             <a:fld id="{2C9EC167-FFA2-4EB7-8B73-3C9F47D00B85}" type="datetimeFigureOut">
               <a:rPr lang="en-US" smtClean="0"/>
-              <a:t>9/14/2014</a:t>
+              <a:t>9/16/2014</a:t>
             </a:fld>
             <a:endParaRPr lang="en-US"/>
           </a:p>
@@ -830,7 +836,7 @@
           <a:p>
             <a:fld id="{AA2BA4C4-4124-4F1E-8DC3-EF7BB95E200E}" type="datetimeFigureOut">
               <a:rPr lang="en-US" smtClean="0"/>
-              <a:t>9/14/2014</a:t>
+              <a:t>9/16/2014</a:t>
             </a:fld>
             <a:endParaRPr lang="en-US"/>
           </a:p>
@@ -1244,7 +1250,7 @@
           <a:p>
             <a:fld id="{AA2BA4C4-4124-4F1E-8DC3-EF7BB95E200E}" type="datetimeFigureOut">
               <a:rPr lang="en-US" smtClean="0"/>
-              <a:t>9/14/2014</a:t>
+              <a:t>9/16/2014</a:t>
             </a:fld>
             <a:endParaRPr lang="en-US"/>
           </a:p>
@@ -1580,7 +1586,7 @@
           <a:p>
             <a:fld id="{AA2BA4C4-4124-4F1E-8DC3-EF7BB95E200E}" type="datetimeFigureOut">
               <a:rPr lang="en-US" smtClean="0"/>
-              <a:t>9/14/2014</a:t>
+              <a:t>9/16/2014</a:t>
             </a:fld>
             <a:endParaRPr lang="en-US"/>
           </a:p>
@@ -1985,7 +1991,7 @@
           <a:p>
             <a:fld id="{AA2BA4C4-4124-4F1E-8DC3-EF7BB95E200E}" type="datetimeFigureOut">
               <a:rPr lang="en-US" smtClean="0"/>
-              <a:t>9/14/2014</a:t>
+              <a:t>9/16/2014</a:t>
             </a:fld>
             <a:endParaRPr lang="en-US"/>
           </a:p>
@@ -2553,7 +2559,7 @@
           <a:p>
             <a:fld id="{AA2BA4C4-4124-4F1E-8DC3-EF7BB95E200E}" type="datetimeFigureOut">
               <a:rPr lang="en-US" smtClean="0"/>
-              <a:t>9/14/2014</a:t>
+              <a:t>9/16/2014</a:t>
             </a:fld>
             <a:endParaRPr lang="en-US"/>
           </a:p>
@@ -3234,7 +3240,7 @@
           <a:p>
             <a:fld id="{AA2BA4C4-4124-4F1E-8DC3-EF7BB95E200E}" type="datetimeFigureOut">
               <a:rPr lang="en-US" smtClean="0"/>
-              <a:t>9/14/2014</a:t>
+              <a:t>9/16/2014</a:t>
             </a:fld>
             <a:endParaRPr lang="en-US"/>
           </a:p>
@@ -4147,7 +4153,7 @@
           <a:p>
             <a:fld id="{AA2BA4C4-4124-4F1E-8DC3-EF7BB95E200E}" type="datetimeFigureOut">
               <a:rPr lang="en-US" smtClean="0"/>
-              <a:t>9/14/2014</a:t>
+              <a:t>9/16/2014</a:t>
             </a:fld>
             <a:endParaRPr lang="en-US"/>
           </a:p>
@@ -4460,7 +4466,7 @@
           <a:p>
             <a:fld id="{AA2BA4C4-4124-4F1E-8DC3-EF7BB95E200E}" type="datetimeFigureOut">
               <a:rPr lang="en-US" smtClean="0"/>
-              <a:t>9/14/2014</a:t>
+              <a:t>9/16/2014</a:t>
             </a:fld>
             <a:endParaRPr lang="en-US"/>
           </a:p>
@@ -4724,7 +4730,7 @@
           <a:p>
             <a:fld id="{AA2BA4C4-4124-4F1E-8DC3-EF7BB95E200E}" type="datetimeFigureOut">
               <a:rPr lang="en-US" smtClean="0"/>
-              <a:t>9/14/2014</a:t>
+              <a:t>9/16/2014</a:t>
             </a:fld>
             <a:endParaRPr lang="en-US"/>
           </a:p>
@@ -5047,7 +5053,7 @@
           <a:p>
             <a:fld id="{AA2BA4C4-4124-4F1E-8DC3-EF7BB95E200E}" type="datetimeFigureOut">
               <a:rPr lang="en-US" smtClean="0"/>
-              <a:t>9/14/2014</a:t>
+              <a:t>9/16/2014</a:t>
             </a:fld>
             <a:endParaRPr lang="en-US"/>
           </a:p>
@@ -5436,7 +5442,7 @@
           <a:p>
             <a:fld id="{AA2BA4C4-4124-4F1E-8DC3-EF7BB95E200E}" type="datetimeFigureOut">
               <a:rPr lang="en-US" smtClean="0"/>
-              <a:t>9/14/2014</a:t>
+              <a:t>9/16/2014</a:t>
             </a:fld>
             <a:endParaRPr lang="en-US"/>
           </a:p>
@@ -5812,7 +5818,7 @@
           <a:p>
             <a:fld id="{AA2BA4C4-4124-4F1E-8DC3-EF7BB95E200E}" type="datetimeFigureOut">
               <a:rPr lang="en-US" smtClean="0"/>
-              <a:t>9/14/2014</a:t>
+              <a:t>9/16/2014</a:t>
             </a:fld>
             <a:endParaRPr lang="en-US"/>
           </a:p>
@@ -6318,7 +6324,7 @@
           <a:p>
             <a:fld id="{AA2BA4C4-4124-4F1E-8DC3-EF7BB95E200E}" type="datetimeFigureOut">
               <a:rPr lang="en-US" smtClean="0"/>
-              <a:t>9/14/2014</a:t>
+              <a:t>9/16/2014</a:t>
             </a:fld>
             <a:endParaRPr lang="en-US"/>
           </a:p>
@@ -6575,7 +6581,7 @@
           <a:p>
             <a:fld id="{AA2BA4C4-4124-4F1E-8DC3-EF7BB95E200E}" type="datetimeFigureOut">
               <a:rPr lang="en-US" smtClean="0"/>
-              <a:t>9/14/2014</a:t>
+              <a:t>9/16/2014</a:t>
             </a:fld>
             <a:endParaRPr lang="en-US"/>
           </a:p>
@@ -6738,7 +6744,7 @@
           <a:p>
             <a:fld id="{AA2BA4C4-4124-4F1E-8DC3-EF7BB95E200E}" type="datetimeFigureOut">
               <a:rPr lang="en-US" smtClean="0"/>
-              <a:t>9/14/2014</a:t>
+              <a:t>9/16/2014</a:t>
             </a:fld>
             <a:endParaRPr lang="en-US"/>
           </a:p>
@@ -7128,7 +7134,7 @@
           <a:p>
             <a:fld id="{AA2BA4C4-4124-4F1E-8DC3-EF7BB95E200E}" type="datetimeFigureOut">
               <a:rPr lang="en-US" smtClean="0"/>
-              <a:t>9/14/2014</a:t>
+              <a:t>9/16/2014</a:t>
             </a:fld>
             <a:endParaRPr lang="en-US"/>
           </a:p>
@@ -7537,7 +7543,7 @@
           <a:p>
             <a:fld id="{AA2BA4C4-4124-4F1E-8DC3-EF7BB95E200E}" type="datetimeFigureOut">
               <a:rPr lang="en-US" smtClean="0"/>
-              <a:t>9/14/2014</a:t>
+              <a:t>9/16/2014</a:t>
             </a:fld>
             <a:endParaRPr lang="en-US"/>
           </a:p>
@@ -7781,7 +7787,7 @@
           <a:p>
             <a:fld id="{AA2BA4C4-4124-4F1E-8DC3-EF7BB95E200E}" type="datetimeFigureOut">
               <a:rPr lang="en-US" smtClean="0"/>
-              <a:t>9/14/2014</a:t>
+              <a:t>9/16/2014</a:t>
             </a:fld>
             <a:endParaRPr lang="en-US"/>
           </a:p>
@@ -8489,6 +8495,127 @@
           <a:p>
             <a:r>
               <a:rPr lang="en-US" dirty="0" smtClean="0"/>
+              <a:t>Requirement Changes</a:t>
+            </a:r>
+            <a:endParaRPr lang="en-US" dirty="0"/>
+          </a:p>
+        </p:txBody>
+      </p:sp>
+      <p:sp>
+        <p:nvSpPr>
+          <p:cNvPr id="3" name="Content Placeholder 2"/>
+          <p:cNvSpPr>
+            <a:spLocks noGrp="1"/>
+          </p:cNvSpPr>
+          <p:nvPr>
+            <p:ph idx="1"/>
+          </p:nvPr>
+        </p:nvSpPr>
+        <p:spPr/>
+        <p:txBody>
+          <a:bodyPr/>
+          <a:lstStyle/>
+          <a:p>
+            <a:r>
+              <a:rPr lang="en-US" dirty="0" smtClean="0"/>
+              <a:t>Initial Requirement</a:t>
+            </a:r>
+          </a:p>
+          <a:p>
+            <a:pPr lvl="1"/>
+            <a:r>
+              <a:rPr lang="en-US" dirty="0"/>
+              <a:t>The system shall operate for a minimum of three consecutive </a:t>
+            </a:r>
+            <a:r>
+              <a:rPr lang="en-US" u="sng" dirty="0"/>
+              <a:t>course rounds </a:t>
+            </a:r>
+            <a:r>
+              <a:rPr lang="en-US" dirty="0"/>
+              <a:t>each having duration of five (5) minutes, on one battery life</a:t>
+            </a:r>
+            <a:r>
+              <a:rPr lang="en-US" dirty="0" smtClean="0"/>
+              <a:t>.</a:t>
+            </a:r>
+          </a:p>
+          <a:p>
+            <a:r>
+              <a:rPr lang="en-US" dirty="0" smtClean="0"/>
+              <a:t>Edited Requirement</a:t>
+            </a:r>
+          </a:p>
+          <a:p>
+            <a:pPr lvl="1"/>
+            <a:r>
+              <a:rPr lang="en-US" dirty="0"/>
+              <a:t>The system shall operate on one battery life for a minimum of three consecutive </a:t>
+            </a:r>
+            <a:r>
+              <a:rPr lang="en-US" u="sng" dirty="0"/>
+              <a:t>course rounds,</a:t>
+            </a:r>
+            <a:r>
+              <a:rPr lang="en-US" dirty="0"/>
+              <a:t> each having duration of five (5) minutes.</a:t>
+            </a:r>
+          </a:p>
+          <a:p>
+            <a:pPr marL="457200" lvl="1" indent="0">
+              <a:buNone/>
+            </a:pPr>
+            <a:endParaRPr lang="en-US" dirty="0" smtClean="0"/>
+          </a:p>
+        </p:txBody>
+      </p:sp>
+    </p:spTree>
+    <p:extLst>
+      <p:ext uri="{BB962C8B-B14F-4D97-AF65-F5344CB8AC3E}">
+        <p14:creationId xmlns:p14="http://schemas.microsoft.com/office/powerpoint/2010/main" val="4193769482"/>
+      </p:ext>
+    </p:extLst>
+  </p:cSld>
+  <p:clrMapOvr>
+    <a:masterClrMapping/>
+  </p:clrMapOvr>
+</p:sld>
+</file>
+
+<file path=ppt/slides/slide5.xml><?xml version="1.0" encoding="utf-8"?>
+<p:sld xmlns:a="http://schemas.openxmlformats.org/drawingml/2006/main" xmlns:r="http://schemas.openxmlformats.org/officeDocument/2006/relationships" xmlns:p="http://schemas.openxmlformats.org/presentationml/2006/main">
+  <p:cSld>
+    <p:spTree>
+      <p:nvGrpSpPr>
+        <p:cNvPr id="1" name=""/>
+        <p:cNvGrpSpPr/>
+        <p:nvPr/>
+      </p:nvGrpSpPr>
+      <p:grpSpPr>
+        <a:xfrm>
+          <a:off x="0" y="0"/>
+          <a:ext cx="0" cy="0"/>
+          <a:chOff x="0" y="0"/>
+          <a:chExt cx="0" cy="0"/>
+        </a:xfrm>
+      </p:grpSpPr>
+      <p:sp>
+        <p:nvSpPr>
+          <p:cNvPr id="2" name="Title 1"/>
+          <p:cNvSpPr>
+            <a:spLocks noGrp="1"/>
+          </p:cNvSpPr>
+          <p:nvPr>
+            <p:ph type="title"/>
+          </p:nvPr>
+        </p:nvSpPr>
+        <p:spPr/>
+        <p:txBody>
+          <a:bodyPr/>
+          <a:lstStyle/>
+          <a:p>
+            <a:r>
+              <a:rPr lang="en-US" dirty="0" smtClean="0"/>
               <a:t>Next Steps</a:t>
             </a:r>
             <a:endParaRPr lang="en-US" dirty="0"/>
@@ -8562,7 +8689,7 @@
 </p:sld>
 </file>
 
-<file path=ppt/slides/slide5.xml><?xml version="1.0" encoding="utf-8"?>
+<file path=ppt/slides/slide6.xml><?xml version="1.0" encoding="utf-8"?>
 <p:sld xmlns:a="http://schemas.openxmlformats.org/drawingml/2006/main" xmlns:r="http://schemas.openxmlformats.org/officeDocument/2006/relationships" xmlns:p="http://schemas.openxmlformats.org/presentationml/2006/main">
   <p:cSld>
     <p:spTree>

</xml_diff>